<commit_message>
multi core giga r1
</commit_message>
<xml_diff>
--- a/Documentation/EEE416.pptx
+++ b/Documentation/EEE416.pptx
@@ -350,7 +350,7 @@
           <a:p>
             <a:fld id="{90830063-3182-4D82-8420-3F6041C9C0E7}" type="datetimeFigureOut">
               <a:rPr lang="en-GB" smtClean="0"/>
-              <a:t>26/02/2024</a:t>
+              <a:t>15/04/2024</a:t>
             </a:fld>
             <a:endParaRPr lang="en-GB"/>
           </a:p>
@@ -674,7 +674,7 @@
           <a:p>
             <a:fld id="{90830063-3182-4D82-8420-3F6041C9C0E7}" type="datetimeFigureOut">
               <a:rPr lang="en-GB" smtClean="0"/>
-              <a:t>26/02/2024</a:t>
+              <a:t>15/04/2024</a:t>
             </a:fld>
             <a:endParaRPr lang="en-GB"/>
           </a:p>
@@ -922,7 +922,7 @@
           <a:p>
             <a:fld id="{90830063-3182-4D82-8420-3F6041C9C0E7}" type="datetimeFigureOut">
               <a:rPr lang="en-GB" smtClean="0"/>
-              <a:t>26/02/2024</a:t>
+              <a:t>15/04/2024</a:t>
             </a:fld>
             <a:endParaRPr lang="en-GB"/>
           </a:p>
@@ -1261,7 +1261,7 @@
           <a:p>
             <a:fld id="{90830063-3182-4D82-8420-3F6041C9C0E7}" type="datetimeFigureOut">
               <a:rPr lang="en-GB" smtClean="0"/>
-              <a:t>26/02/2024</a:t>
+              <a:t>15/04/2024</a:t>
             </a:fld>
             <a:endParaRPr lang="en-GB"/>
           </a:p>
@@ -1608,7 +1608,7 @@
           <a:p>
             <a:fld id="{90830063-3182-4D82-8420-3F6041C9C0E7}" type="datetimeFigureOut">
               <a:rPr lang="en-GB" smtClean="0"/>
-              <a:t>26/02/2024</a:t>
+              <a:t>15/04/2024</a:t>
             </a:fld>
             <a:endParaRPr lang="en-GB"/>
           </a:p>
@@ -1982,7 +1982,7 @@
           <a:p>
             <a:fld id="{90830063-3182-4D82-8420-3F6041C9C0E7}" type="datetimeFigureOut">
               <a:rPr lang="en-GB" smtClean="0"/>
-              <a:t>26/02/2024</a:t>
+              <a:t>15/04/2024</a:t>
             </a:fld>
             <a:endParaRPr lang="en-GB"/>
           </a:p>
@@ -2452,7 +2452,7 @@
           <a:p>
             <a:fld id="{90830063-3182-4D82-8420-3F6041C9C0E7}" type="datetimeFigureOut">
               <a:rPr lang="en-GB" smtClean="0"/>
-              <a:t>26/02/2024</a:t>
+              <a:t>15/04/2024</a:t>
             </a:fld>
             <a:endParaRPr lang="en-GB"/>
           </a:p>
@@ -2657,7 +2657,7 @@
           <a:p>
             <a:fld id="{90830063-3182-4D82-8420-3F6041C9C0E7}" type="datetimeFigureOut">
               <a:rPr lang="en-GB" smtClean="0"/>
-              <a:t>26/02/2024</a:t>
+              <a:t>15/04/2024</a:t>
             </a:fld>
             <a:endParaRPr lang="en-GB"/>
           </a:p>
@@ -2868,7 +2868,7 @@
           <a:p>
             <a:fld id="{90830063-3182-4D82-8420-3F6041C9C0E7}" type="datetimeFigureOut">
               <a:rPr lang="en-GB" smtClean="0"/>
-              <a:t>26/02/2024</a:t>
+              <a:t>15/04/2024</a:t>
             </a:fld>
             <a:endParaRPr lang="en-GB"/>
           </a:p>
@@ -3103,7 +3103,7 @@
           <a:p>
             <a:fld id="{90830063-3182-4D82-8420-3F6041C9C0E7}" type="datetimeFigureOut">
               <a:rPr lang="en-GB" smtClean="0"/>
-              <a:t>26/02/2024</a:t>
+              <a:t>15/04/2024</a:t>
             </a:fld>
             <a:endParaRPr lang="en-GB"/>
           </a:p>
@@ -3351,7 +3351,7 @@
           <a:p>
             <a:fld id="{90830063-3182-4D82-8420-3F6041C9C0E7}" type="datetimeFigureOut">
               <a:rPr lang="en-GB" smtClean="0"/>
-              <a:t>26/02/2024</a:t>
+              <a:t>15/04/2024</a:t>
             </a:fld>
             <a:endParaRPr lang="en-GB"/>
           </a:p>
@@ -3649,7 +3649,7 @@
           <a:p>
             <a:fld id="{90830063-3182-4D82-8420-3F6041C9C0E7}" type="datetimeFigureOut">
               <a:rPr lang="en-GB" smtClean="0"/>
-              <a:t>26/02/2024</a:t>
+              <a:t>15/04/2024</a:t>
             </a:fld>
             <a:endParaRPr lang="en-GB"/>
           </a:p>
@@ -4031,7 +4031,7 @@
           <a:p>
             <a:fld id="{90830063-3182-4D82-8420-3F6041C9C0E7}" type="datetimeFigureOut">
               <a:rPr lang="en-GB" smtClean="0"/>
-              <a:t>26/02/2024</a:t>
+              <a:t>15/04/2024</a:t>
             </a:fld>
             <a:endParaRPr lang="en-GB"/>
           </a:p>
@@ -4180,7 +4180,7 @@
           <a:p>
             <a:fld id="{90830063-3182-4D82-8420-3F6041C9C0E7}" type="datetimeFigureOut">
               <a:rPr lang="en-GB" smtClean="0"/>
-              <a:t>26/02/2024</a:t>
+              <a:t>15/04/2024</a:t>
             </a:fld>
             <a:endParaRPr lang="en-GB"/>
           </a:p>
@@ -4306,7 +4306,7 @@
           <a:p>
             <a:fld id="{90830063-3182-4D82-8420-3F6041C9C0E7}" type="datetimeFigureOut">
               <a:rPr lang="en-GB" smtClean="0"/>
-              <a:t>26/02/2024</a:t>
+              <a:t>15/04/2024</a:t>
             </a:fld>
             <a:endParaRPr lang="en-GB"/>
           </a:p>
@@ -4561,7 +4561,7 @@
           <a:p>
             <a:fld id="{90830063-3182-4D82-8420-3F6041C9C0E7}" type="datetimeFigureOut">
               <a:rPr lang="en-GB" smtClean="0"/>
-              <a:t>26/02/2024</a:t>
+              <a:t>15/04/2024</a:t>
             </a:fld>
             <a:endParaRPr lang="en-GB"/>
           </a:p>
@@ -4876,7 +4876,7 @@
           <a:p>
             <a:fld id="{90830063-3182-4D82-8420-3F6041C9C0E7}" type="datetimeFigureOut">
               <a:rPr lang="en-GB" smtClean="0"/>
-              <a:t>26/02/2024</a:t>
+              <a:t>15/04/2024</a:t>
             </a:fld>
             <a:endParaRPr lang="en-GB"/>
           </a:p>
@@ -5120,7 +5120,7 @@
           <a:p>
             <a:fld id="{90830063-3182-4D82-8420-3F6041C9C0E7}" type="datetimeFigureOut">
               <a:rPr lang="en-GB" smtClean="0"/>
-              <a:t>26/02/2024</a:t>
+              <a:t>15/04/2024</a:t>
             </a:fld>
             <a:endParaRPr lang="en-GB"/>
           </a:p>
@@ -7027,7 +7027,7 @@
             <a:pPr lvl="1"/>
             <a:r>
               <a:rPr lang="en-GB" dirty="0"/>
-              <a:t>Takes audio signal from guitar and sends it over Bluetooth to a phone and to a receiving Bluetooth audio device.</a:t>
+              <a:t>Takes audio signal from guitar and sends it over Bluetooth to a phone/PC and to a receiving Bluetooth audio device.</a:t>
             </a:r>
           </a:p>
           <a:p>
@@ -7046,7 +7046,7 @@
           <a:p>
             <a:r>
               <a:rPr lang="en-GB" sz="2000" dirty="0"/>
-              <a:t>Process ‘C’ – Phone user interface</a:t>
+              <a:t>Process ‘C’ – Phone/PC user interface</a:t>
             </a:r>
           </a:p>
           <a:p>
@@ -7158,7 +7158,7 @@
               <a:rPr lang="en-GB" sz="2000" dirty="0">
                 <a:latin typeface="Garamond (Body)"/>
               </a:rPr>
-              <a:t>Guitar pickups generate micro voltage signal which is sent along the 3.5 mm audio cable connected to circuit.</a:t>
+              <a:t>Guitar pickups generate small voltage signal which is sent along the 3.5 mm audio cable connected to circuit.</a:t>
             </a:r>
           </a:p>
           <a:p>
@@ -7174,26 +7174,17 @@
               <a:rPr lang="en-GB" sz="2000" dirty="0">
                 <a:latin typeface="Garamond (Body)"/>
               </a:rPr>
-              <a:t>Arduino Nano ESP32 reads (not sure) </a:t>
-            </a:r>
-            <a:r>
-              <a:rPr lang="en-GB" sz="2000" strike="sngStrike" dirty="0">
+              <a:t>Arduino Nano ESP32 reads as 12 bit at 32 </a:t>
+            </a:r>
+            <a:r>
+              <a:rPr lang="en-GB" sz="2000" dirty="0" err="1">
                 <a:latin typeface="Garamond (Body)"/>
               </a:rPr>
-              <a:t>10bit precision at 9.26 </a:t>
-            </a:r>
-            <a:r>
-              <a:rPr lang="en-GB" sz="2000" strike="sngStrike" dirty="0" err="1">
-                <a:latin typeface="Garamond (Body)"/>
-              </a:rPr>
-              <a:t>kHZ.</a:t>
-            </a:r>
-            <a:r>
-              <a:rPr lang="en-GB" sz="2000" strike="sngStrike" dirty="0">
-                <a:latin typeface="Garamond (Body)"/>
-              </a:rPr>
-              <a:t> (not great, not terrible). </a:t>
-            </a:r>
+              <a:t>kHZ</a:t>
+            </a:r>
+            <a:endParaRPr lang="en-GB" sz="2000" dirty="0">
+              <a:latin typeface="Garamond (Body)"/>
+            </a:endParaRPr>
           </a:p>
           <a:p>
             <a:r>
@@ -7235,7 +7226,7 @@
               <a:rPr lang="en-GB" sz="2000" dirty="0">
                 <a:latin typeface="Garamond (Body)"/>
               </a:rPr>
-              <a:t>It should be possible to also pair with a mobile phone at the same time and send the data there.</a:t>
+              <a:t>It should be possible to also pair with a mobile phone or PC at the same time and send the data there.</a:t>
             </a:r>
           </a:p>
         </p:txBody>
@@ -7375,7 +7366,7 @@
                 <a:effectLst/>
                 <a:latin typeface="Garamond (Body)"/>
               </a:rPr>
-              <a:t> audio codec set as an I</a:t>
+              <a:t> audio codec module set as an I</a:t>
             </a:r>
             <a:r>
               <a:rPr lang="en-GB" sz="2000" b="0" i="0" baseline="30000" dirty="0">
@@ -7508,7 +7499,7 @@
           <a:p>
             <a:r>
               <a:rPr lang="en-GB" b="1" dirty="0"/>
-              <a:t>Phone user interface</a:t>
+              <a:t>Phone/PC user interface</a:t>
             </a:r>
           </a:p>
         </p:txBody>
@@ -7553,11 +7544,20 @@
               <a:rPr lang="en-GB" sz="2000" dirty="0">
                 <a:latin typeface="Garamond (Body)"/>
               </a:rPr>
-              <a:t>Note detection</a:t>
+              <a:t>Stetch objectives</a:t>
             </a:r>
           </a:p>
           <a:p>
             <a:pPr lvl="1"/>
+            <a:r>
+              <a:rPr lang="en-GB" sz="1600" dirty="0">
+                <a:latin typeface="Garamond (Body)"/>
+              </a:rPr>
+              <a:t>Note detection (Stretch objective)</a:t>
+            </a:r>
+          </a:p>
+          <a:p>
+            <a:pPr lvl="2"/>
             <a:r>
               <a:rPr lang="en-GB" dirty="0">
                 <a:latin typeface="Garamond (Body)"/>
@@ -7566,7 +7566,7 @@
             </a:r>
           </a:p>
           <a:p>
-            <a:pPr lvl="1"/>
+            <a:pPr lvl="2"/>
             <a:r>
               <a:rPr lang="en-GB" dirty="0">
                 <a:latin typeface="Garamond (Body)"/>
@@ -7575,9 +7575,9 @@
             </a:r>
           </a:p>
           <a:p>
-            <a:pPr lvl="1"/>
-            <a:r>
-              <a:rPr lang="en-GB" sz="2000" dirty="0">
+            <a:pPr lvl="2"/>
+            <a:r>
+              <a:rPr lang="en-GB" dirty="0">
                 <a:solidFill>
                   <a:srgbClr val="000000"/>
                 </a:solidFill>
@@ -7590,14 +7590,15 @@
             </a:endParaRPr>
           </a:p>
           <a:p>
-            <a:r>
-              <a:rPr lang="en-GB" sz="2000" dirty="0">
+            <a:pPr lvl="1"/>
+            <a:r>
+              <a:rPr lang="en-GB" sz="1600" dirty="0">
                 <a:latin typeface="Garamond (Body)"/>
               </a:rPr>
               <a:t>By sampling the audio signal and sending a stream to Shazam API ‘</a:t>
             </a:r>
             <a:r>
-              <a:rPr lang="en-GB" sz="2000" b="0" i="0" dirty="0">
+              <a:rPr lang="en-GB" sz="1600" b="0" i="0" dirty="0">
                 <a:solidFill>
                   <a:srgbClr val="000000"/>
                 </a:solidFill>
@@ -7608,8 +7609,9 @@
             </a:r>
           </a:p>
           <a:p>
-            <a:r>
-              <a:rPr lang="en-GB" sz="2000" dirty="0">
+            <a:pPr lvl="1"/>
+            <a:r>
+              <a:rPr lang="en-GB" sz="1600" dirty="0">
                 <a:solidFill>
                   <a:srgbClr val="000000"/>
                 </a:solidFill>
@@ -7617,7 +7619,7 @@
               </a:rPr>
               <a:t>Apply ‘Effects’ on sound – e.g. echo.</a:t>
             </a:r>
-            <a:endParaRPr lang="en-GB" sz="2000" dirty="0">
+            <a:endParaRPr lang="en-GB" sz="1600" dirty="0">
               <a:latin typeface="Garamond (Body)"/>
             </a:endParaRPr>
           </a:p>
@@ -7976,23 +7978,6 @@
 </file>
 
 <file path=customXml/item1.xml><?xml version="1.0" encoding="utf-8"?>
-<?mso-contentType ?>
-<FormTemplates xmlns="http://schemas.microsoft.com/sharepoint/v3/contenttype/forms">
-  <Display>DocumentLibraryForm</Display>
-  <Edit>DocumentLibraryForm</Edit>
-  <New>DocumentLibraryForm</New>
-</FormTemplates>
-</file>
-
-<file path=customXml/item2.xml><?xml version="1.0" encoding="utf-8"?>
-<p:properties xmlns:p="http://schemas.microsoft.com/office/2006/metadata/properties" xmlns:xsi="http://www.w3.org/2001/XMLSchema-instance" xmlns:pc="http://schemas.microsoft.com/office/infopath/2007/PartnerControls">
-  <documentManagement>
-    <_activity xmlns="93a0c076-877a-438a-9e05-e30d9a10c90a" xsi:nil="true"/>
-  </documentManagement>
-</p:properties>
-</file>
-
-<file path=customXml/item3.xml><?xml version="1.0" encoding="utf-8"?>
 <ct:contentTypeSchema xmlns:ct="http://schemas.microsoft.com/office/2006/metadata/contentType" xmlns:ma="http://schemas.microsoft.com/office/2006/metadata/properties/metaAttributes" ct:_="" ma:_="" ma:contentTypeName="Document" ma:contentTypeID="0x01010094BFD0D60E12584688CED6A18B78A0AD" ma:contentTypeVersion="8" ma:contentTypeDescription="Create a new document." ma:contentTypeScope="" ma:versionID="98bdef9135e92e2709490f192b4c4a25">
   <xsd:schema xmlns:xsd="http://www.w3.org/2001/XMLSchema" xmlns:xs="http://www.w3.org/2001/XMLSchema" xmlns:p="http://schemas.microsoft.com/office/2006/metadata/properties" xmlns:ns3="93a0c076-877a-438a-9e05-e30d9a10c90a" xmlns:ns4="6de55ced-1110-4033-9fe0-a9c6e1127aee" targetNamespace="http://schemas.microsoft.com/office/2006/metadata/properties" ma:root="true" ma:fieldsID="1583a15166195f16a7bebcd60c02c135" ns3:_="" ns4:_="">
     <xsd:import namespace="93a0c076-877a-438a-9e05-e30d9a10c90a"/>
@@ -8181,10 +8166,38 @@
 </ct:contentTypeSchema>
 </file>
 
+<file path=customXml/item2.xml><?xml version="1.0" encoding="utf-8"?>
+<p:properties xmlns:p="http://schemas.microsoft.com/office/2006/metadata/properties" xmlns:xsi="http://www.w3.org/2001/XMLSchema-instance" xmlns:pc="http://schemas.microsoft.com/office/infopath/2007/PartnerControls">
+  <documentManagement>
+    <_activity xmlns="93a0c076-877a-438a-9e05-e30d9a10c90a" xsi:nil="true"/>
+  </documentManagement>
+</p:properties>
+</file>
+
+<file path=customXml/item3.xml><?xml version="1.0" encoding="utf-8"?>
+<?mso-contentType ?>
+<FormTemplates xmlns="http://schemas.microsoft.com/sharepoint/v3/contenttype/forms">
+  <Display>DocumentLibraryForm</Display>
+  <Edit>DocumentLibraryForm</Edit>
+  <New>DocumentLibraryForm</New>
+</FormTemplates>
+</file>
+
 <file path=customXml/itemProps1.xml><?xml version="1.0" encoding="utf-8"?>
-<ds:datastoreItem xmlns:ds="http://schemas.openxmlformats.org/officeDocument/2006/customXml" ds:itemID="{98AF6850-8906-40D8-BDD4-FCE8E352CE18}">
+<ds:datastoreItem xmlns:ds="http://schemas.openxmlformats.org/officeDocument/2006/customXml" ds:itemID="{9FB2DBE0-4AD7-493C-B1C5-F1422C0D9F53}">
   <ds:schemaRefs>
-    <ds:schemaRef ds:uri="http://schemas.microsoft.com/sharepoint/v3/contenttype/forms"/>
+    <ds:schemaRef ds:uri="http://schemas.microsoft.com/office/2006/metadata/contentType"/>
+    <ds:schemaRef ds:uri="http://schemas.microsoft.com/office/2006/metadata/properties/metaAttributes"/>
+    <ds:schemaRef ds:uri="http://www.w3.org/2001/XMLSchema"/>
+    <ds:schemaRef ds:uri="http://schemas.microsoft.com/office/2006/metadata/properties"/>
+    <ds:schemaRef ds:uri="93a0c076-877a-438a-9e05-e30d9a10c90a"/>
+    <ds:schemaRef ds:uri="6de55ced-1110-4033-9fe0-a9c6e1127aee"/>
+    <ds:schemaRef ds:uri="http://schemas.microsoft.com/office/2006/documentManagement/types"/>
+    <ds:schemaRef ds:uri="http://schemas.microsoft.com/office/infopath/2007/PartnerControls"/>
+    <ds:schemaRef ds:uri="http://schemas.openxmlformats.org/package/2006/metadata/core-properties"/>
+    <ds:schemaRef ds:uri="http://purl.org/dc/elements/1.1/"/>
+    <ds:schemaRef ds:uri="http://purl.org/dc/terms/"/>
+    <ds:schemaRef ds:uri="http://schemas.microsoft.com/internal/obd"/>
   </ds:schemaRefs>
 </ds:datastoreItem>
 </file>
@@ -8207,20 +8220,9 @@
 </file>
 
 <file path=customXml/itemProps3.xml><?xml version="1.0" encoding="utf-8"?>
-<ds:datastoreItem xmlns:ds="http://schemas.openxmlformats.org/officeDocument/2006/customXml" ds:itemID="{9FB2DBE0-4AD7-493C-B1C5-F1422C0D9F53}">
+<ds:datastoreItem xmlns:ds="http://schemas.openxmlformats.org/officeDocument/2006/customXml" ds:itemID="{98AF6850-8906-40D8-BDD4-FCE8E352CE18}">
   <ds:schemaRefs>
-    <ds:schemaRef ds:uri="http://schemas.microsoft.com/office/2006/metadata/contentType"/>
-    <ds:schemaRef ds:uri="http://schemas.microsoft.com/office/2006/metadata/properties/metaAttributes"/>
-    <ds:schemaRef ds:uri="http://www.w3.org/2001/XMLSchema"/>
-    <ds:schemaRef ds:uri="http://schemas.microsoft.com/office/2006/metadata/properties"/>
-    <ds:schemaRef ds:uri="93a0c076-877a-438a-9e05-e30d9a10c90a"/>
-    <ds:schemaRef ds:uri="6de55ced-1110-4033-9fe0-a9c6e1127aee"/>
-    <ds:schemaRef ds:uri="http://schemas.microsoft.com/office/2006/documentManagement/types"/>
-    <ds:schemaRef ds:uri="http://schemas.microsoft.com/office/infopath/2007/PartnerControls"/>
-    <ds:schemaRef ds:uri="http://schemas.openxmlformats.org/package/2006/metadata/core-properties"/>
-    <ds:schemaRef ds:uri="http://purl.org/dc/elements/1.1/"/>
-    <ds:schemaRef ds:uri="http://purl.org/dc/terms/"/>
-    <ds:schemaRef ds:uri="http://schemas.microsoft.com/internal/obd"/>
+    <ds:schemaRef ds:uri="http://schemas.microsoft.com/sharepoint/v3/contenttype/forms"/>
   </ds:schemaRefs>
 </ds:datastoreItem>
 </file>
</xml_diff>